<commit_message>
feature: add more css adjustment.
</commit_message>
<xml_diff>
--- a/doc/page design.pptx
+++ b/doc/page design.pptx
@@ -5,10 +5,13 @@
     <p:sldMasterId id="2147483648" r:id="rId1"/>
   </p:sldMasterIdLst>
   <p:notesMasterIdLst>
-    <p:notesMasterId r:id="rId3"/>
+    <p:notesMasterId r:id="rId6"/>
   </p:notesMasterIdLst>
   <p:sldIdLst>
     <p:sldId id="256" r:id="rId2"/>
+    <p:sldId id="258" r:id="rId3"/>
+    <p:sldId id="259" r:id="rId4"/>
+    <p:sldId id="257" r:id="rId5"/>
   </p:sldIdLst>
   <p:sldSz cx="12192000" cy="6858000"/>
   <p:notesSz cx="6858000" cy="9144000"/>
@@ -107,6 +110,11 @@
       </a:defRPr>
     </a:lvl9pPr>
   </p:defaultTextStyle>
+  <p:extLst>
+    <p:ext uri="{EFAFB233-063F-42B5-8137-9DF3F51BA10A}">
+      <p15:sldGuideLst xmlns:p15="http://schemas.microsoft.com/office/powerpoint/2012/main"/>
+    </p:ext>
+  </p:extLst>
 </p:presentation>
 </file>
 
@@ -503,18 +511,7 @@
           <a:bodyPr/>
           <a:lstStyle/>
           <a:p>
-            <a:r>
-              <a:rPr lang="en-US" dirty="0"/>
-              <a:t>https://</a:t>
-            </a:r>
-            <a:r>
-              <a:rPr lang="en-US" dirty="0" err="1"/>
-              <a:t>kenreitz.org</a:t>
-            </a:r>
-            <a:r>
-              <a:rPr lang="en-US" dirty="0"/>
-              <a:t>/</a:t>
-            </a:r>
+            <a:endParaRPr lang="en-US" dirty="0"/>
           </a:p>
         </p:txBody>
       </p:sp>
@@ -3768,6 +3765,36 @@
           <a:chExt cx="0" cy="0"/>
         </a:xfrm>
       </p:grpSpPr>
+      <p:pic>
+        <p:nvPicPr>
+          <p:cNvPr id="3" name="Picture 2" descr="A person holding a camera&#10;&#10;Description automatically generated with medium confidence">
+            <a:extLst>
+              <a:ext uri="{FF2B5EF4-FFF2-40B4-BE49-F238E27FC236}">
+                <a16:creationId xmlns:a16="http://schemas.microsoft.com/office/drawing/2014/main" id="{FCA65451-A5FF-0B4D-997A-11290E2DB3A1}"/>
+              </a:ext>
+            </a:extLst>
+          </p:cNvPr>
+          <p:cNvPicPr>
+            <a:picLocks noChangeAspect="1"/>
+          </p:cNvPicPr>
+          <p:nvPr/>
+        </p:nvPicPr>
+        <p:blipFill>
+          <a:blip r:embed="rId3"/>
+          <a:stretch>
+            <a:fillRect/>
+          </a:stretch>
+        </p:blipFill>
+        <p:spPr>
+          <a:xfrm>
+            <a:off x="2910253" y="807976"/>
+            <a:ext cx="6577349" cy="5170033"/>
+          </a:xfrm>
+          <a:prstGeom prst="rect">
+            <a:avLst/>
+          </a:prstGeom>
+        </p:spPr>
+      </p:pic>
       <p:sp>
         <p:nvSpPr>
           <p:cNvPr id="13" name="Rectangle 12">
@@ -3826,7 +3853,7 @@
         </p:nvSpPr>
         <p:spPr>
           <a:xfrm>
-            <a:off x="94593" y="63060"/>
+            <a:off x="94593" y="43810"/>
             <a:ext cx="11981794" cy="809297"/>
           </a:xfrm>
           <a:prstGeom prst="rect">
@@ -3927,8 +3954,8 @@
         </p:nvSpPr>
         <p:spPr>
           <a:xfrm>
-            <a:off x="4456386" y="143038"/>
-            <a:ext cx="7394032" cy="646331"/>
+            <a:off x="5043638" y="143038"/>
+            <a:ext cx="6806780" cy="646331"/>
           </a:xfrm>
           <a:prstGeom prst="rect">
             <a:avLst/>
@@ -3972,7 +3999,7 @@
         </p:nvSpPr>
         <p:spPr>
           <a:xfrm>
-            <a:off x="4572002" y="206098"/>
+            <a:off x="5193473" y="213897"/>
             <a:ext cx="1124607" cy="523220"/>
           </a:xfrm>
           <a:prstGeom prst="rect">
@@ -4021,8 +4048,8 @@
         </p:nvSpPr>
         <p:spPr>
           <a:xfrm>
-            <a:off x="7304691" y="205345"/>
-            <a:ext cx="877614" cy="523220"/>
+            <a:off x="8136317" y="214036"/>
+            <a:ext cx="859083" cy="523220"/>
           </a:xfrm>
           <a:prstGeom prst="rect">
             <a:avLst/>
@@ -4070,8 +4097,8 @@
         </p:nvSpPr>
         <p:spPr>
           <a:xfrm>
-            <a:off x="5864777" y="205345"/>
-            <a:ext cx="1237594" cy="523220"/>
+            <a:off x="6474034" y="213897"/>
+            <a:ext cx="1496039" cy="523220"/>
           </a:xfrm>
           <a:prstGeom prst="rect">
             <a:avLst/>
@@ -4099,7 +4126,7 @@
           <a:p>
             <a:r>
               <a:rPr lang="en-US" altLang="zh-TW" sz="2800" dirty="0"/>
-              <a:t>Project</a:t>
+              <a:t>Portfolio</a:t>
             </a:r>
             <a:endParaRPr lang="en-US" sz="2800" dirty="0"/>
           </a:p>
@@ -4168,8 +4195,8 @@
         </p:nvSpPr>
         <p:spPr>
           <a:xfrm>
-            <a:off x="8405652" y="205345"/>
-            <a:ext cx="1813031" cy="523220"/>
+            <a:off x="9137434" y="213897"/>
+            <a:ext cx="1081249" cy="523220"/>
           </a:xfrm>
           <a:prstGeom prst="rect">
             <a:avLst/>
@@ -4197,7 +4224,7 @@
           <a:p>
             <a:r>
               <a:rPr lang="en-US" altLang="zh-TW" sz="2800" dirty="0"/>
-              <a:t>Playground</a:t>
+              <a:t>Demo</a:t>
             </a:r>
             <a:endParaRPr lang="en-US" sz="2800" dirty="0"/>
           </a:p>
@@ -4235,10 +4262,607 @@
           </a:p>
         </p:txBody>
       </p:sp>
+      <p:sp>
+        <p:nvSpPr>
+          <p:cNvPr id="5" name="Rectangle 4">
+            <a:extLst>
+              <a:ext uri="{FF2B5EF4-FFF2-40B4-BE49-F238E27FC236}">
+                <a16:creationId xmlns:a16="http://schemas.microsoft.com/office/drawing/2014/main" id="{35E2F8DF-0794-0A44-9843-AC90D8B90D0B}"/>
+              </a:ext>
+            </a:extLst>
+          </p:cNvPr>
+          <p:cNvSpPr/>
+          <p:nvPr/>
+        </p:nvSpPr>
+        <p:spPr>
+          <a:xfrm>
+            <a:off x="7984133" y="5411791"/>
+            <a:ext cx="2118785" cy="369332"/>
+          </a:xfrm>
+          <a:prstGeom prst="rect">
+            <a:avLst/>
+          </a:prstGeom>
+        </p:spPr>
+        <p:txBody>
+          <a:bodyPr wrap="none">
+            <a:spAutoFit/>
+          </a:bodyPr>
+          <a:lstStyle/>
+          <a:p>
+            <a:r>
+              <a:rPr lang="en-US" dirty="0">
+                <a:hlinkClick r:id="rId4"/>
+              </a:rPr>
+              <a:t>https://</a:t>
+            </a:r>
+            <a:r>
+              <a:rPr lang="en-US" dirty="0" err="1">
+                <a:hlinkClick r:id="rId4"/>
+              </a:rPr>
+              <a:t>kenreitz.org</a:t>
+            </a:r>
+            <a:r>
+              <a:rPr lang="en-US" dirty="0">
+                <a:hlinkClick r:id="rId4"/>
+              </a:rPr>
+              <a:t>/</a:t>
+            </a:r>
+            <a:endParaRPr lang="en-US" dirty="0"/>
+          </a:p>
+        </p:txBody>
+      </p:sp>
     </p:spTree>
     <p:extLst>
       <p:ext uri="{BB962C8B-B14F-4D97-AF65-F5344CB8AC3E}">
         <p14:creationId xmlns:p14="http://schemas.microsoft.com/office/powerpoint/2010/main" val="3816334420"/>
+      </p:ext>
+    </p:extLst>
+  </p:cSld>
+  <p:clrMapOvr>
+    <a:masterClrMapping/>
+  </p:clrMapOvr>
+</p:sld>
+</file>
+
+<file path=ppt/slides/slide2.xml><?xml version="1.0" encoding="utf-8"?>
+<p:sld xmlns:a="http://schemas.openxmlformats.org/drawingml/2006/main" xmlns:r="http://schemas.openxmlformats.org/officeDocument/2006/relationships" xmlns:p="http://schemas.openxmlformats.org/presentationml/2006/main">
+  <p:cSld>
+    <p:spTree>
+      <p:nvGrpSpPr>
+        <p:cNvPr id="1" name=""/>
+        <p:cNvGrpSpPr/>
+        <p:nvPr/>
+      </p:nvGrpSpPr>
+      <p:grpSpPr>
+        <a:xfrm>
+          <a:off x="0" y="0"/>
+          <a:ext cx="0" cy="0"/>
+          <a:chOff x="0" y="0"/>
+          <a:chExt cx="0" cy="0"/>
+        </a:xfrm>
+      </p:grpSpPr>
+      <p:sp>
+        <p:nvSpPr>
+          <p:cNvPr id="2" name="Title 1">
+            <a:extLst>
+              <a:ext uri="{FF2B5EF4-FFF2-40B4-BE49-F238E27FC236}">
+                <a16:creationId xmlns:a16="http://schemas.microsoft.com/office/drawing/2014/main" id="{2B962253-B259-1240-8BD3-F5E2520AF6EA}"/>
+              </a:ext>
+            </a:extLst>
+          </p:cNvPr>
+          <p:cNvSpPr>
+            <a:spLocks noGrp="1"/>
+          </p:cNvSpPr>
+          <p:nvPr>
+            <p:ph type="title"/>
+          </p:nvPr>
+        </p:nvSpPr>
+        <p:spPr/>
+        <p:txBody>
+          <a:bodyPr/>
+          <a:lstStyle/>
+          <a:p>
+            <a:endParaRPr lang="en-US"/>
+          </a:p>
+        </p:txBody>
+      </p:sp>
+      <p:sp>
+        <p:nvSpPr>
+          <p:cNvPr id="3" name="Content Placeholder 2">
+            <a:extLst>
+              <a:ext uri="{FF2B5EF4-FFF2-40B4-BE49-F238E27FC236}">
+                <a16:creationId xmlns:a16="http://schemas.microsoft.com/office/drawing/2014/main" id="{B3CA0B46-D543-1E4C-B285-C663A7612A83}"/>
+              </a:ext>
+            </a:extLst>
+          </p:cNvPr>
+          <p:cNvSpPr>
+            <a:spLocks noGrp="1"/>
+          </p:cNvSpPr>
+          <p:nvPr>
+            <p:ph idx="1"/>
+          </p:nvPr>
+        </p:nvSpPr>
+        <p:spPr/>
+        <p:txBody>
+          <a:bodyPr/>
+          <a:lstStyle/>
+          <a:p>
+            <a:endParaRPr lang="en-US"/>
+          </a:p>
+        </p:txBody>
+      </p:sp>
+    </p:spTree>
+    <p:extLst>
+      <p:ext uri="{BB962C8B-B14F-4D97-AF65-F5344CB8AC3E}">
+        <p14:creationId xmlns:p14="http://schemas.microsoft.com/office/powerpoint/2010/main" val="493996912"/>
+      </p:ext>
+    </p:extLst>
+  </p:cSld>
+  <p:clrMapOvr>
+    <a:masterClrMapping/>
+  </p:clrMapOvr>
+</p:sld>
+</file>
+
+<file path=ppt/slides/slide3.xml><?xml version="1.0" encoding="utf-8"?>
+<p:sld xmlns:a="http://schemas.openxmlformats.org/drawingml/2006/main" xmlns:r="http://schemas.openxmlformats.org/officeDocument/2006/relationships" xmlns:p="http://schemas.openxmlformats.org/presentationml/2006/main">
+  <p:cSld>
+    <p:spTree>
+      <p:nvGrpSpPr>
+        <p:cNvPr id="1" name=""/>
+        <p:cNvGrpSpPr/>
+        <p:nvPr/>
+      </p:nvGrpSpPr>
+      <p:grpSpPr>
+        <a:xfrm>
+          <a:off x="0" y="0"/>
+          <a:ext cx="0" cy="0"/>
+          <a:chOff x="0" y="0"/>
+          <a:chExt cx="0" cy="0"/>
+        </a:xfrm>
+      </p:grpSpPr>
+      <p:sp>
+        <p:nvSpPr>
+          <p:cNvPr id="2" name="Title 1">
+            <a:extLst>
+              <a:ext uri="{FF2B5EF4-FFF2-40B4-BE49-F238E27FC236}">
+                <a16:creationId xmlns:a16="http://schemas.microsoft.com/office/drawing/2014/main" id="{6514243F-C5B2-8D4E-A613-BE757C8F15BE}"/>
+              </a:ext>
+            </a:extLst>
+          </p:cNvPr>
+          <p:cNvSpPr>
+            <a:spLocks noGrp="1"/>
+          </p:cNvSpPr>
+          <p:nvPr>
+            <p:ph type="title"/>
+          </p:nvPr>
+        </p:nvSpPr>
+        <p:spPr/>
+        <p:txBody>
+          <a:bodyPr/>
+          <a:lstStyle/>
+          <a:p>
+            <a:endParaRPr lang="en-US"/>
+          </a:p>
+        </p:txBody>
+      </p:sp>
+      <p:sp>
+        <p:nvSpPr>
+          <p:cNvPr id="3" name="Content Placeholder 2">
+            <a:extLst>
+              <a:ext uri="{FF2B5EF4-FFF2-40B4-BE49-F238E27FC236}">
+                <a16:creationId xmlns:a16="http://schemas.microsoft.com/office/drawing/2014/main" id="{04F9FA9C-37AE-7442-99EC-4E9ECFA357D0}"/>
+              </a:ext>
+            </a:extLst>
+          </p:cNvPr>
+          <p:cNvSpPr>
+            <a:spLocks noGrp="1"/>
+          </p:cNvSpPr>
+          <p:nvPr>
+            <p:ph idx="1"/>
+          </p:nvPr>
+        </p:nvSpPr>
+        <p:spPr/>
+        <p:txBody>
+          <a:bodyPr/>
+          <a:lstStyle/>
+          <a:p>
+            <a:endParaRPr lang="en-US" dirty="0"/>
+          </a:p>
+        </p:txBody>
+      </p:sp>
+    </p:spTree>
+    <p:extLst>
+      <p:ext uri="{BB962C8B-B14F-4D97-AF65-F5344CB8AC3E}">
+        <p14:creationId xmlns:p14="http://schemas.microsoft.com/office/powerpoint/2010/main" val="4025185860"/>
+      </p:ext>
+    </p:extLst>
+  </p:cSld>
+  <p:clrMapOvr>
+    <a:masterClrMapping/>
+  </p:clrMapOvr>
+</p:sld>
+</file>
+
+<file path=ppt/slides/slide4.xml><?xml version="1.0" encoding="utf-8"?>
+<p:sld xmlns:a="http://schemas.openxmlformats.org/drawingml/2006/main" xmlns:r="http://schemas.openxmlformats.org/officeDocument/2006/relationships" xmlns:p="http://schemas.openxmlformats.org/presentationml/2006/main">
+  <p:cSld>
+    <p:spTree>
+      <p:nvGrpSpPr>
+        <p:cNvPr id="1" name=""/>
+        <p:cNvGrpSpPr/>
+        <p:nvPr/>
+      </p:nvGrpSpPr>
+      <p:grpSpPr>
+        <a:xfrm>
+          <a:off x="0" y="0"/>
+          <a:ext cx="0" cy="0"/>
+          <a:chOff x="0" y="0"/>
+          <a:chExt cx="0" cy="0"/>
+        </a:xfrm>
+      </p:grpSpPr>
+      <p:sp>
+        <p:nvSpPr>
+          <p:cNvPr id="2" name="Title 1">
+            <a:extLst>
+              <a:ext uri="{FF2B5EF4-FFF2-40B4-BE49-F238E27FC236}">
+                <a16:creationId xmlns:a16="http://schemas.microsoft.com/office/drawing/2014/main" id="{852D0457-2699-8845-A100-66017B4A1BA7}"/>
+              </a:ext>
+            </a:extLst>
+          </p:cNvPr>
+          <p:cNvSpPr>
+            <a:spLocks noGrp="1"/>
+          </p:cNvSpPr>
+          <p:nvPr>
+            <p:ph type="title"/>
+          </p:nvPr>
+        </p:nvSpPr>
+        <p:spPr/>
+        <p:txBody>
+          <a:bodyPr/>
+          <a:lstStyle/>
+          <a:p>
+            <a:r>
+              <a:rPr lang="en-US" altLang="zh-TW" dirty="0"/>
+              <a:t>Ref</a:t>
+            </a:r>
+            <a:r>
+              <a:rPr lang="zh-TW" altLang="en-US" dirty="0"/>
+              <a:t> </a:t>
+            </a:r>
+            <a:r>
+              <a:rPr lang="en-US" altLang="zh-TW" dirty="0"/>
+              <a:t>name</a:t>
+            </a:r>
+            <a:endParaRPr lang="en-US" dirty="0"/>
+          </a:p>
+        </p:txBody>
+      </p:sp>
+      <p:sp>
+        <p:nvSpPr>
+          <p:cNvPr id="3" name="Content Placeholder 2">
+            <a:extLst>
+              <a:ext uri="{FF2B5EF4-FFF2-40B4-BE49-F238E27FC236}">
+                <a16:creationId xmlns:a16="http://schemas.microsoft.com/office/drawing/2014/main" id="{1C602A0B-3F3C-7C4B-A8AF-4B5C30519079}"/>
+              </a:ext>
+            </a:extLst>
+          </p:cNvPr>
+          <p:cNvSpPr>
+            <a:spLocks noGrp="1"/>
+          </p:cNvSpPr>
+          <p:nvPr>
+            <p:ph idx="1"/>
+          </p:nvPr>
+        </p:nvSpPr>
+        <p:spPr>
+          <a:xfrm>
+            <a:off x="424314" y="1928780"/>
+            <a:ext cx="10515600" cy="4351338"/>
+          </a:xfrm>
+        </p:spPr>
+        <p:txBody>
+          <a:bodyPr/>
+          <a:lstStyle/>
+          <a:p>
+            <a:pPr marL="0" indent="0">
+              <a:buNone/>
+            </a:pPr>
+            <a:r>
+              <a:rPr lang="ja-JP" altLang="en-US"/>
+              <a:t>頂部</a:t>
+            </a:r>
+            <a:r>
+              <a:rPr lang="en-US" altLang="ja-JP" dirty="0"/>
+              <a:t>:</a:t>
+            </a:r>
+            <a:r>
+              <a:rPr lang="en-US" dirty="0"/>
+              <a:t>header</a:t>
+            </a:r>
+            <a:br>
+              <a:rPr lang="en-US" dirty="0"/>
+            </a:br>
+            <a:r>
+              <a:rPr lang="ja-JP" altLang="en-US"/>
+              <a:t>內容</a:t>
+            </a:r>
+            <a:r>
+              <a:rPr lang="en-US" altLang="ja-JP" dirty="0"/>
+              <a:t>:</a:t>
+            </a:r>
+            <a:r>
+              <a:rPr lang="en-US" dirty="0"/>
+              <a:t>content/container</a:t>
+            </a:r>
+            <a:br>
+              <a:rPr lang="en-US" dirty="0"/>
+            </a:br>
+            <a:r>
+              <a:rPr lang="ja-JP" altLang="en-US"/>
+              <a:t>尾部</a:t>
+            </a:r>
+            <a:r>
+              <a:rPr lang="en-US" altLang="ja-JP" dirty="0"/>
+              <a:t>:</a:t>
+            </a:r>
+            <a:r>
+              <a:rPr lang="en-US" dirty="0"/>
+              <a:t>footer</a:t>
+            </a:r>
+            <a:br>
+              <a:rPr lang="en-US" dirty="0"/>
+            </a:br>
+            <a:r>
+              <a:rPr lang="ja-JP" altLang="en-US"/>
+              <a:t>選單</a:t>
+            </a:r>
+            <a:r>
+              <a:rPr lang="en-US" altLang="ja-JP" dirty="0"/>
+              <a:t>:</a:t>
+            </a:r>
+            <a:r>
+              <a:rPr lang="en-US" dirty="0"/>
+              <a:t>nav/navigation</a:t>
+            </a:r>
+            <a:br>
+              <a:rPr lang="en-US" dirty="0"/>
+            </a:br>
+            <a:r>
+              <a:rPr lang="ja-JP" altLang="en-US"/>
+              <a:t>側欄</a:t>
+            </a:r>
+            <a:r>
+              <a:rPr lang="en-US" altLang="ja-JP" dirty="0"/>
+              <a:t>:</a:t>
+            </a:r>
+            <a:r>
+              <a:rPr lang="en-US" dirty="0"/>
+              <a:t>sidebar</a:t>
+            </a:r>
+            <a:br>
+              <a:rPr lang="en-US" dirty="0"/>
+            </a:br>
+            <a:r>
+              <a:rPr lang="ja-JP" altLang="en-US"/>
+              <a:t>欄目</a:t>
+            </a:r>
+            <a:r>
+              <a:rPr lang="en-US" altLang="ja-JP" dirty="0"/>
+              <a:t>:</a:t>
+            </a:r>
+            <a:r>
+              <a:rPr lang="en-US" dirty="0"/>
+              <a:t>column</a:t>
+            </a:r>
+            <a:br>
+              <a:rPr lang="en-US" dirty="0"/>
+            </a:br>
+            <a:r>
+              <a:rPr lang="ja-JP" altLang="en-US"/>
+              <a:t>頁面控制整體佈局寬度</a:t>
+            </a:r>
+            <a:r>
+              <a:rPr lang="en-US" altLang="ja-JP" dirty="0"/>
+              <a:t>:</a:t>
+            </a:r>
+            <a:r>
+              <a:rPr lang="en-US" dirty="0"/>
+              <a:t>wrapper</a:t>
+            </a:r>
+            <a:br>
+              <a:rPr lang="en-US" dirty="0"/>
+            </a:br>
+            <a:r>
+              <a:rPr lang="ja-JP" altLang="en-US"/>
+              <a:t>主要區域</a:t>
+            </a:r>
+            <a:r>
+              <a:rPr lang="en-US" altLang="ja-JP" dirty="0"/>
+              <a:t>(</a:t>
+            </a:r>
+            <a:r>
+              <a:rPr lang="ja-JP" altLang="en-US"/>
+              <a:t>通常為頁面主要內容部份</a:t>
+            </a:r>
+            <a:r>
+              <a:rPr lang="en-US" altLang="ja-JP" dirty="0"/>
+              <a:t>):</a:t>
+            </a:r>
+            <a:r>
+              <a:rPr lang="en-US" dirty="0"/>
+              <a:t>primary</a:t>
+            </a:r>
+            <a:br>
+              <a:rPr lang="en-US" dirty="0"/>
+            </a:br>
+            <a:r>
+              <a:rPr lang="ja-JP" altLang="en-US"/>
+              <a:t>次要區域</a:t>
+            </a:r>
+            <a:r>
+              <a:rPr lang="en-US" altLang="ja-JP" dirty="0"/>
+              <a:t>(</a:t>
+            </a:r>
+            <a:r>
+              <a:rPr lang="ja-JP" altLang="en-US"/>
+              <a:t>通常為次選單</a:t>
+            </a:r>
+            <a:r>
+              <a:rPr lang="en-US" altLang="ja-JP" dirty="0"/>
+              <a:t>):</a:t>
+            </a:r>
+            <a:r>
+              <a:rPr lang="en-US" dirty="0"/>
+              <a:t>secondary</a:t>
+            </a:r>
+          </a:p>
+        </p:txBody>
+      </p:sp>
+      <p:pic>
+        <p:nvPicPr>
+          <p:cNvPr id="5" name="Picture 4" descr="Chart, diagram, box and whisker chart&#10;&#10;Description automatically generated">
+            <a:extLst>
+              <a:ext uri="{FF2B5EF4-FFF2-40B4-BE49-F238E27FC236}">
+                <a16:creationId xmlns:a16="http://schemas.microsoft.com/office/drawing/2014/main" id="{3461ADAC-AA20-A843-B5EC-E250D676DFBF}"/>
+              </a:ext>
+            </a:extLst>
+          </p:cNvPr>
+          <p:cNvPicPr>
+            <a:picLocks noChangeAspect="1"/>
+          </p:cNvPicPr>
+          <p:nvPr/>
+        </p:nvPicPr>
+        <p:blipFill>
+          <a:blip r:embed="rId2"/>
+          <a:stretch>
+            <a:fillRect/>
+          </a:stretch>
+        </p:blipFill>
+        <p:spPr>
+          <a:xfrm>
+            <a:off x="6853187" y="107347"/>
+            <a:ext cx="5150452" cy="4248183"/>
+          </a:xfrm>
+          <a:prstGeom prst="rect">
+            <a:avLst/>
+          </a:prstGeom>
+        </p:spPr>
+      </p:pic>
+      <p:sp>
+        <p:nvSpPr>
+          <p:cNvPr id="6" name="Rectangle 5">
+            <a:hlinkClick r:id="rId3"/>
+            <a:extLst>
+              <a:ext uri="{FF2B5EF4-FFF2-40B4-BE49-F238E27FC236}">
+                <a16:creationId xmlns:a16="http://schemas.microsoft.com/office/drawing/2014/main" id="{63FC2271-530E-1E4A-8EA1-D30305817C8D}"/>
+              </a:ext>
+            </a:extLst>
+          </p:cNvPr>
+          <p:cNvSpPr/>
+          <p:nvPr/>
+        </p:nvSpPr>
+        <p:spPr>
+          <a:xfrm>
+            <a:off x="7431948" y="5910786"/>
+            <a:ext cx="4412298" cy="369332"/>
+          </a:xfrm>
+          <a:prstGeom prst="rect">
+            <a:avLst/>
+          </a:prstGeom>
+        </p:spPr>
+        <p:txBody>
+          <a:bodyPr wrap="none">
+            <a:spAutoFit/>
+          </a:bodyPr>
+          <a:lstStyle/>
+          <a:p>
+            <a:r>
+              <a:rPr lang="en-US" dirty="0">
+                <a:hlinkClick r:id="rId3"/>
+              </a:rPr>
+              <a:t>https://</a:t>
+            </a:r>
+            <a:r>
+              <a:rPr lang="en-US" dirty="0" err="1">
+                <a:hlinkClick r:id="rId3"/>
+              </a:rPr>
+              <a:t>kknews.cc</a:t>
+            </a:r>
+            <a:r>
+              <a:rPr lang="en-US" dirty="0">
+                <a:hlinkClick r:id="rId3"/>
+              </a:rPr>
+              <a:t>/</a:t>
+            </a:r>
+            <a:r>
+              <a:rPr lang="en-US" dirty="0" err="1">
+                <a:hlinkClick r:id="rId3"/>
+              </a:rPr>
+              <a:t>zh-tw</a:t>
+            </a:r>
+            <a:r>
+              <a:rPr lang="en-US" dirty="0">
+                <a:hlinkClick r:id="rId3"/>
+              </a:rPr>
+              <a:t>/code/o98bjvm.html</a:t>
+            </a:r>
+            <a:endParaRPr lang="en-US" dirty="0"/>
+          </a:p>
+        </p:txBody>
+      </p:sp>
+      <p:sp>
+        <p:nvSpPr>
+          <p:cNvPr id="7" name="Rectangle 6">
+            <a:extLst>
+              <a:ext uri="{FF2B5EF4-FFF2-40B4-BE49-F238E27FC236}">
+                <a16:creationId xmlns:a16="http://schemas.microsoft.com/office/drawing/2014/main" id="{49343AC2-F8F9-C949-8CA7-C9723A973094}"/>
+              </a:ext>
+            </a:extLst>
+          </p:cNvPr>
+          <p:cNvSpPr/>
+          <p:nvPr/>
+        </p:nvSpPr>
+        <p:spPr>
+          <a:xfrm>
+            <a:off x="7431948" y="6333544"/>
+            <a:ext cx="4507581" cy="369332"/>
+          </a:xfrm>
+          <a:prstGeom prst="rect">
+            <a:avLst/>
+          </a:prstGeom>
+        </p:spPr>
+        <p:txBody>
+          <a:bodyPr wrap="none">
+            <a:spAutoFit/>
+          </a:bodyPr>
+          <a:lstStyle/>
+          <a:p>
+            <a:r>
+              <a:rPr lang="en-US" dirty="0">
+                <a:hlinkClick r:id="rId4"/>
+              </a:rPr>
+              <a:t>https://</a:t>
+            </a:r>
+            <a:r>
+              <a:rPr lang="en-US" dirty="0" err="1">
+                <a:hlinkClick r:id="rId4"/>
+              </a:rPr>
+              <a:t>ezcshi.pixnet.net</a:t>
+            </a:r>
+            <a:r>
+              <a:rPr lang="en-US" dirty="0">
+                <a:hlinkClick r:id="rId4"/>
+              </a:rPr>
+              <a:t>/blog/post/13294937</a:t>
+            </a:r>
+            <a:endParaRPr lang="en-US" dirty="0"/>
+          </a:p>
+        </p:txBody>
+      </p:sp>
+    </p:spTree>
+    <p:extLst>
+      <p:ext uri="{BB962C8B-B14F-4D97-AF65-F5344CB8AC3E}">
+        <p14:creationId xmlns:p14="http://schemas.microsoft.com/office/powerpoint/2010/main" val="1057126453"/>
       </p:ext>
     </p:extLst>
   </p:cSld>

</xml_diff>

<commit_message>
add jquery file and some modify
</commit_message>
<xml_diff>
--- a/doc/page design.pptx
+++ b/doc/page design.pptx
@@ -5,13 +5,14 @@
     <p:sldMasterId id="2147483648" r:id="rId1"/>
   </p:sldMasterIdLst>
   <p:notesMasterIdLst>
-    <p:notesMasterId r:id="rId6"/>
+    <p:notesMasterId r:id="rId7"/>
   </p:notesMasterIdLst>
   <p:sldIdLst>
     <p:sldId id="256" r:id="rId2"/>
     <p:sldId id="258" r:id="rId3"/>
     <p:sldId id="259" r:id="rId4"/>
-    <p:sldId id="257" r:id="rId5"/>
+    <p:sldId id="260" r:id="rId5"/>
+    <p:sldId id="257" r:id="rId6"/>
   </p:sldIdLst>
   <p:sldSz cx="12192000" cy="6858000"/>
   <p:notesSz cx="6858000" cy="9144000"/>
@@ -200,7 +201,7 @@
           <a:p>
             <a:fld id="{13B2DAF2-BD77-584D-ADD5-AD9CFA98BA5C}" type="datetimeFigureOut">
               <a:rPr lang="en-US" smtClean="0"/>
-              <a:t>8/10/21</a:t>
+              <a:t>9/7/21</a:t>
             </a:fld>
             <a:endParaRPr lang="en-US"/>
           </a:p>
@@ -698,7 +699,7 @@
           <a:p>
             <a:fld id="{5D41B4D0-D3ED-8D43-BD61-3AFF2E816EE8}" type="datetimeFigureOut">
               <a:rPr lang="en-US" smtClean="0"/>
-              <a:t>8/10/21</a:t>
+              <a:t>9/7/21</a:t>
             </a:fld>
             <a:endParaRPr lang="en-US"/>
           </a:p>
@@ -896,7 +897,7 @@
           <a:p>
             <a:fld id="{5D41B4D0-D3ED-8D43-BD61-3AFF2E816EE8}" type="datetimeFigureOut">
               <a:rPr lang="en-US" smtClean="0"/>
-              <a:t>8/10/21</a:t>
+              <a:t>9/7/21</a:t>
             </a:fld>
             <a:endParaRPr lang="en-US"/>
           </a:p>
@@ -1104,7 +1105,7 @@
           <a:p>
             <a:fld id="{5D41B4D0-D3ED-8D43-BD61-3AFF2E816EE8}" type="datetimeFigureOut">
               <a:rPr lang="en-US" smtClean="0"/>
-              <a:t>8/10/21</a:t>
+              <a:t>9/7/21</a:t>
             </a:fld>
             <a:endParaRPr lang="en-US"/>
           </a:p>
@@ -1302,7 +1303,7 @@
           <a:p>
             <a:fld id="{5D41B4D0-D3ED-8D43-BD61-3AFF2E816EE8}" type="datetimeFigureOut">
               <a:rPr lang="en-US" smtClean="0"/>
-              <a:t>8/10/21</a:t>
+              <a:t>9/7/21</a:t>
             </a:fld>
             <a:endParaRPr lang="en-US"/>
           </a:p>
@@ -1577,7 +1578,7 @@
           <a:p>
             <a:fld id="{5D41B4D0-D3ED-8D43-BD61-3AFF2E816EE8}" type="datetimeFigureOut">
               <a:rPr lang="en-US" smtClean="0"/>
-              <a:t>8/10/21</a:t>
+              <a:t>9/7/21</a:t>
             </a:fld>
             <a:endParaRPr lang="en-US"/>
           </a:p>
@@ -1842,7 +1843,7 @@
           <a:p>
             <a:fld id="{5D41B4D0-D3ED-8D43-BD61-3AFF2E816EE8}" type="datetimeFigureOut">
               <a:rPr lang="en-US" smtClean="0"/>
-              <a:t>8/10/21</a:t>
+              <a:t>9/7/21</a:t>
             </a:fld>
             <a:endParaRPr lang="en-US"/>
           </a:p>
@@ -2254,7 +2255,7 @@
           <a:p>
             <a:fld id="{5D41B4D0-D3ED-8D43-BD61-3AFF2E816EE8}" type="datetimeFigureOut">
               <a:rPr lang="en-US" smtClean="0"/>
-              <a:t>8/10/21</a:t>
+              <a:t>9/7/21</a:t>
             </a:fld>
             <a:endParaRPr lang="en-US"/>
           </a:p>
@@ -2395,7 +2396,7 @@
           <a:p>
             <a:fld id="{5D41B4D0-D3ED-8D43-BD61-3AFF2E816EE8}" type="datetimeFigureOut">
               <a:rPr lang="en-US" smtClean="0"/>
-              <a:t>8/10/21</a:t>
+              <a:t>9/7/21</a:t>
             </a:fld>
             <a:endParaRPr lang="en-US"/>
           </a:p>
@@ -2508,7 +2509,7 @@
           <a:p>
             <a:fld id="{5D41B4D0-D3ED-8D43-BD61-3AFF2E816EE8}" type="datetimeFigureOut">
               <a:rPr lang="en-US" smtClean="0"/>
-              <a:t>8/10/21</a:t>
+              <a:t>9/7/21</a:t>
             </a:fld>
             <a:endParaRPr lang="en-US"/>
           </a:p>
@@ -2819,7 +2820,7 @@
           <a:p>
             <a:fld id="{5D41B4D0-D3ED-8D43-BD61-3AFF2E816EE8}" type="datetimeFigureOut">
               <a:rPr lang="en-US" smtClean="0"/>
-              <a:t>8/10/21</a:t>
+              <a:t>9/7/21</a:t>
             </a:fld>
             <a:endParaRPr lang="en-US"/>
           </a:p>
@@ -3107,7 +3108,7 @@
           <a:p>
             <a:fld id="{5D41B4D0-D3ED-8D43-BD61-3AFF2E816EE8}" type="datetimeFigureOut">
               <a:rPr lang="en-US" smtClean="0"/>
-              <a:t>8/10/21</a:t>
+              <a:t>9/7/21</a:t>
             </a:fld>
             <a:endParaRPr lang="en-US"/>
           </a:p>
@@ -3348,7 +3349,7 @@
           <a:p>
             <a:fld id="{5D41B4D0-D3ED-8D43-BD61-3AFF2E816EE8}" type="datetimeFigureOut">
               <a:rPr lang="en-US" smtClean="0"/>
-              <a:t>8/10/21</a:t>
+              <a:t>9/7/21</a:t>
             </a:fld>
             <a:endParaRPr lang="en-US"/>
           </a:p>
@@ -3765,6 +3766,50 @@
           <a:chExt cx="0" cy="0"/>
         </a:xfrm>
       </p:grpSpPr>
+      <p:sp>
+        <p:nvSpPr>
+          <p:cNvPr id="14" name="Rectangle 13">
+            <a:extLst>
+              <a:ext uri="{FF2B5EF4-FFF2-40B4-BE49-F238E27FC236}">
+                <a16:creationId xmlns:a16="http://schemas.microsoft.com/office/drawing/2014/main" id="{11A307B1-F866-544C-8CF5-06CFCA74353D}"/>
+              </a:ext>
+            </a:extLst>
+          </p:cNvPr>
+          <p:cNvSpPr/>
+          <p:nvPr/>
+        </p:nvSpPr>
+        <p:spPr>
+          <a:xfrm>
+            <a:off x="94593" y="960887"/>
+            <a:ext cx="11981794" cy="4980268"/>
+          </a:xfrm>
+          <a:prstGeom prst="rect">
+            <a:avLst/>
+          </a:prstGeom>
+        </p:spPr>
+        <p:style>
+          <a:lnRef idx="2">
+            <a:schemeClr val="accent6"/>
+          </a:lnRef>
+          <a:fillRef idx="1">
+            <a:schemeClr val="lt1"/>
+          </a:fillRef>
+          <a:effectRef idx="0">
+            <a:schemeClr val="accent6"/>
+          </a:effectRef>
+          <a:fontRef idx="minor">
+            <a:schemeClr val="dk1"/>
+          </a:fontRef>
+        </p:style>
+        <p:txBody>
+          <a:bodyPr rtlCol="0" anchor="ctr"/>
+          <a:lstStyle/>
+          <a:p>
+            <a:pPr algn="ctr"/>
+            <a:endParaRPr lang="en-US"/>
+          </a:p>
+        </p:txBody>
+      </p:sp>
       <p:pic>
         <p:nvPicPr>
           <p:cNvPr id="3" name="Picture 2" descr="A person holding a camera&#10;&#10;Description automatically generated with medium confidence">
@@ -3787,8 +3832,8 @@
         </p:blipFill>
         <p:spPr>
           <a:xfrm>
-            <a:off x="2910253" y="807976"/>
-            <a:ext cx="6577349" cy="5170033"/>
+            <a:off x="3022224" y="1039553"/>
+            <a:ext cx="6140283" cy="4826484"/>
           </a:xfrm>
           <a:prstGeom prst="rect">
             <a:avLst/>
@@ -3809,7 +3854,7 @@
         </p:nvSpPr>
         <p:spPr>
           <a:xfrm>
-            <a:off x="94593" y="5905665"/>
+            <a:off x="94593" y="6004893"/>
             <a:ext cx="11981794" cy="809297"/>
           </a:xfrm>
           <a:prstGeom prst="rect">
@@ -3925,16 +3970,11 @@
           <a:lstStyle/>
           <a:p>
             <a:r>
-              <a:rPr lang="en-US" altLang="zh-TW" sz="3600" dirty="0"/>
-              <a:t>Albert</a:t>
-            </a:r>
-            <a:r>
-              <a:rPr lang="zh-TW" altLang="en-US" sz="3600" dirty="0"/>
-              <a:t> </a:t>
-            </a:r>
-            <a:r>
-              <a:rPr lang="en-US" altLang="zh-TW" sz="3600" dirty="0"/>
-              <a:t>Teng</a:t>
+              <a:rPr lang="en-US" sz="3600" b="1" dirty="0">
+                <a:latin typeface="SAVOYE LET PLAIN:1.0" pitchFamily="2" charset="0"/>
+                <a:cs typeface="APPLE CHANCERY" panose="03020702040506060504" pitchFamily="66" charset="-79"/>
+              </a:rPr>
+              <a:t>Albert Teng</a:t>
             </a:r>
             <a:endParaRPr lang="en-US" sz="3600" dirty="0"/>
           </a:p>
@@ -4343,31 +4383,6 @@
       </p:grpSpPr>
       <p:sp>
         <p:nvSpPr>
-          <p:cNvPr id="2" name="Title 1">
-            <a:extLst>
-              <a:ext uri="{FF2B5EF4-FFF2-40B4-BE49-F238E27FC236}">
-                <a16:creationId xmlns:a16="http://schemas.microsoft.com/office/drawing/2014/main" id="{2B962253-B259-1240-8BD3-F5E2520AF6EA}"/>
-              </a:ext>
-            </a:extLst>
-          </p:cNvPr>
-          <p:cNvSpPr>
-            <a:spLocks noGrp="1"/>
-          </p:cNvSpPr>
-          <p:nvPr>
-            <p:ph type="title"/>
-          </p:nvPr>
-        </p:nvSpPr>
-        <p:spPr/>
-        <p:txBody>
-          <a:bodyPr/>
-          <a:lstStyle/>
-          <a:p>
-            <a:endParaRPr lang="en-US"/>
-          </a:p>
-        </p:txBody>
-      </p:sp>
-      <p:sp>
-        <p:nvSpPr>
           <p:cNvPr id="3" name="Content Placeholder 2">
             <a:extLst>
               <a:ext uri="{FF2B5EF4-FFF2-40B4-BE49-F238E27FC236}">
@@ -4382,12 +4397,53 @@
             <p:ph idx="1"/>
           </p:nvPr>
         </p:nvSpPr>
-        <p:spPr/>
-        <p:txBody>
-          <a:bodyPr/>
-          <a:lstStyle/>
-          <a:p>
-            <a:endParaRPr lang="en-US"/>
+        <p:spPr>
+          <a:xfrm>
+            <a:off x="838200" y="873902"/>
+            <a:ext cx="10515600" cy="4351338"/>
+          </a:xfrm>
+        </p:spPr>
+        <p:txBody>
+          <a:bodyPr/>
+          <a:lstStyle/>
+          <a:p>
+            <a:pPr marL="0" indent="0">
+              <a:buNone/>
+            </a:pPr>
+            <a:r>
+              <a:rPr lang="en-US" dirty="0"/>
+              <a:t>Functions waiting to Implement:</a:t>
+            </a:r>
+          </a:p>
+          <a:p>
+            <a:r>
+              <a:rPr lang="en-US" dirty="0"/>
+              <a:t>Sign up</a:t>
+            </a:r>
+          </a:p>
+          <a:p>
+            <a:r>
+              <a:rPr lang="en-US" dirty="0"/>
+              <a:t>Login </a:t>
+            </a:r>
+          </a:p>
+          <a:p>
+            <a:r>
+              <a:rPr lang="en-US" dirty="0"/>
+              <a:t>Shopping cart</a:t>
+            </a:r>
+          </a:p>
+          <a:p>
+            <a:endParaRPr lang="en-US" dirty="0"/>
+          </a:p>
+          <a:p>
+            <a:r>
+              <a:rPr lang="en-US" dirty="0"/>
+              <a:t>Blog</a:t>
+            </a:r>
+          </a:p>
+          <a:p>
+            <a:endParaRPr lang="en-US" dirty="0"/>
           </a:p>
         </p:txBody>
       </p:sp>
@@ -4506,7 +4562,7 @@
           <p:cNvPr id="2" name="Title 1">
             <a:extLst>
               <a:ext uri="{FF2B5EF4-FFF2-40B4-BE49-F238E27FC236}">
-                <a16:creationId xmlns:a16="http://schemas.microsoft.com/office/drawing/2014/main" id="{852D0457-2699-8845-A100-66017B4A1BA7}"/>
+                <a16:creationId xmlns:a16="http://schemas.microsoft.com/office/drawing/2014/main" id="{716D6BF6-4E6C-FF45-9802-4FA0E86C1A64}"/>
               </a:ext>
             </a:extLst>
           </p:cNvPr>
@@ -4522,19 +4578,7 @@
           <a:bodyPr/>
           <a:lstStyle/>
           <a:p>
-            <a:r>
-              <a:rPr lang="en-US" altLang="zh-TW" dirty="0"/>
-              <a:t>Ref</a:t>
-            </a:r>
-            <a:r>
-              <a:rPr lang="zh-TW" altLang="en-US" dirty="0"/>
-              <a:t> </a:t>
-            </a:r>
-            <a:r>
-              <a:rPr lang="en-US" altLang="zh-TW" dirty="0"/>
-              <a:t>name</a:t>
-            </a:r>
-            <a:endParaRPr lang="en-US" dirty="0"/>
+            <a:endParaRPr lang="en-US"/>
           </a:p>
         </p:txBody>
       </p:sp>
@@ -4543,7 +4587,7 @@
           <p:cNvPr id="3" name="Content Placeholder 2">
             <a:extLst>
               <a:ext uri="{FF2B5EF4-FFF2-40B4-BE49-F238E27FC236}">
-                <a16:creationId xmlns:a16="http://schemas.microsoft.com/office/drawing/2014/main" id="{1C602A0B-3F3C-7C4B-A8AF-4B5C30519079}"/>
+                <a16:creationId xmlns:a16="http://schemas.microsoft.com/office/drawing/2014/main" id="{0F8DB8ED-9ECD-934F-B5AD-9CEC8EE0D755}"/>
               </a:ext>
             </a:extLst>
           </p:cNvPr>
@@ -4554,170 +4598,45 @@
             <p:ph idx="1"/>
           </p:nvPr>
         </p:nvSpPr>
-        <p:spPr>
-          <a:xfrm>
-            <a:off x="424314" y="1928780"/>
-            <a:ext cx="10515600" cy="4351338"/>
-          </a:xfrm>
-        </p:spPr>
-        <p:txBody>
-          <a:bodyPr/>
-          <a:lstStyle/>
-          <a:p>
-            <a:pPr marL="0" indent="0">
-              <a:buNone/>
-            </a:pPr>
-            <a:r>
-              <a:rPr lang="ja-JP" altLang="en-US"/>
-              <a:t>頂部</a:t>
-            </a:r>
-            <a:r>
-              <a:rPr lang="en-US" altLang="ja-JP" dirty="0"/>
-              <a:t>:</a:t>
-            </a:r>
-            <a:r>
-              <a:rPr lang="en-US" dirty="0"/>
-              <a:t>header</a:t>
-            </a:r>
-            <a:br>
-              <a:rPr lang="en-US" dirty="0"/>
-            </a:br>
-            <a:r>
-              <a:rPr lang="ja-JP" altLang="en-US"/>
-              <a:t>內容</a:t>
-            </a:r>
-            <a:r>
-              <a:rPr lang="en-US" altLang="ja-JP" dirty="0"/>
-              <a:t>:</a:t>
-            </a:r>
-            <a:r>
-              <a:rPr lang="en-US" dirty="0"/>
-              <a:t>content/container</a:t>
-            </a:r>
-            <a:br>
-              <a:rPr lang="en-US" dirty="0"/>
-            </a:br>
-            <a:r>
-              <a:rPr lang="ja-JP" altLang="en-US"/>
-              <a:t>尾部</a:t>
-            </a:r>
-            <a:r>
-              <a:rPr lang="en-US" altLang="ja-JP" dirty="0"/>
-              <a:t>:</a:t>
-            </a:r>
-            <a:r>
-              <a:rPr lang="en-US" dirty="0"/>
-              <a:t>footer</a:t>
-            </a:r>
-            <a:br>
-              <a:rPr lang="en-US" dirty="0"/>
-            </a:br>
-            <a:r>
-              <a:rPr lang="ja-JP" altLang="en-US"/>
-              <a:t>選單</a:t>
-            </a:r>
-            <a:r>
-              <a:rPr lang="en-US" altLang="ja-JP" dirty="0"/>
-              <a:t>:</a:t>
-            </a:r>
-            <a:r>
-              <a:rPr lang="en-US" dirty="0"/>
-              <a:t>nav/navigation</a:t>
-            </a:r>
-            <a:br>
-              <a:rPr lang="en-US" dirty="0"/>
-            </a:br>
-            <a:r>
-              <a:rPr lang="ja-JP" altLang="en-US"/>
-              <a:t>側欄</a:t>
-            </a:r>
-            <a:r>
-              <a:rPr lang="en-US" altLang="ja-JP" dirty="0"/>
-              <a:t>:</a:t>
-            </a:r>
-            <a:r>
-              <a:rPr lang="en-US" dirty="0"/>
-              <a:t>sidebar</a:t>
-            </a:r>
-            <a:br>
-              <a:rPr lang="en-US" dirty="0"/>
-            </a:br>
-            <a:r>
-              <a:rPr lang="ja-JP" altLang="en-US"/>
-              <a:t>欄目</a:t>
-            </a:r>
-            <a:r>
-              <a:rPr lang="en-US" altLang="ja-JP" dirty="0"/>
-              <a:t>:</a:t>
-            </a:r>
-            <a:r>
-              <a:rPr lang="en-US" dirty="0"/>
-              <a:t>column</a:t>
-            </a:r>
-            <a:br>
-              <a:rPr lang="en-US" dirty="0"/>
-            </a:br>
-            <a:r>
-              <a:rPr lang="ja-JP" altLang="en-US"/>
-              <a:t>頁面控制整體佈局寬度</a:t>
-            </a:r>
-            <a:r>
-              <a:rPr lang="en-US" altLang="ja-JP" dirty="0"/>
-              <a:t>:</a:t>
-            </a:r>
-            <a:r>
-              <a:rPr lang="en-US" dirty="0"/>
-              <a:t>wrapper</a:t>
-            </a:r>
-            <a:br>
-              <a:rPr lang="en-US" dirty="0"/>
-            </a:br>
-            <a:r>
-              <a:rPr lang="ja-JP" altLang="en-US"/>
-              <a:t>主要區域</a:t>
-            </a:r>
-            <a:r>
-              <a:rPr lang="en-US" altLang="ja-JP" dirty="0"/>
-              <a:t>(</a:t>
-            </a:r>
-            <a:r>
-              <a:rPr lang="ja-JP" altLang="en-US"/>
-              <a:t>通常為頁面主要內容部份</a:t>
-            </a:r>
-            <a:r>
-              <a:rPr lang="en-US" altLang="ja-JP" dirty="0"/>
-              <a:t>):</a:t>
-            </a:r>
-            <a:r>
-              <a:rPr lang="en-US" dirty="0"/>
-              <a:t>primary</a:t>
-            </a:r>
-            <a:br>
-              <a:rPr lang="en-US" dirty="0"/>
-            </a:br>
-            <a:r>
-              <a:rPr lang="ja-JP" altLang="en-US"/>
-              <a:t>次要區域</a:t>
-            </a:r>
-            <a:r>
-              <a:rPr lang="en-US" altLang="ja-JP" dirty="0"/>
-              <a:t>(</a:t>
-            </a:r>
-            <a:r>
-              <a:rPr lang="ja-JP" altLang="en-US"/>
-              <a:t>通常為次選單</a:t>
-            </a:r>
-            <a:r>
-              <a:rPr lang="en-US" altLang="ja-JP" dirty="0"/>
-              <a:t>):</a:t>
-            </a:r>
-            <a:r>
-              <a:rPr lang="en-US" dirty="0"/>
-              <a:t>secondary</a:t>
-            </a:r>
-          </a:p>
-        </p:txBody>
-      </p:sp>
+        <p:spPr/>
+        <p:txBody>
+          <a:bodyPr/>
+          <a:lstStyle/>
+          <a:p>
+            <a:endParaRPr lang="en-US"/>
+          </a:p>
+        </p:txBody>
+      </p:sp>
+    </p:spTree>
+    <p:extLst>
+      <p:ext uri="{BB962C8B-B14F-4D97-AF65-F5344CB8AC3E}">
+        <p14:creationId xmlns:p14="http://schemas.microsoft.com/office/powerpoint/2010/main" val="805927055"/>
+      </p:ext>
+    </p:extLst>
+  </p:cSld>
+  <p:clrMapOvr>
+    <a:masterClrMapping/>
+  </p:clrMapOvr>
+</p:sld>
+</file>
+
+<file path=ppt/slides/slide5.xml><?xml version="1.0" encoding="utf-8"?>
+<p:sld xmlns:a="http://schemas.openxmlformats.org/drawingml/2006/main" xmlns:r="http://schemas.openxmlformats.org/officeDocument/2006/relationships" xmlns:p="http://schemas.openxmlformats.org/presentationml/2006/main">
+  <p:cSld>
+    <p:spTree>
+      <p:nvGrpSpPr>
+        <p:cNvPr id="1" name=""/>
+        <p:cNvGrpSpPr/>
+        <p:nvPr/>
+      </p:nvGrpSpPr>
+      <p:grpSpPr>
+        <a:xfrm>
+          <a:off x="0" y="0"/>
+          <a:ext cx="0" cy="0"/>
+          <a:chOff x="0" y="0"/>
+          <a:chExt cx="0" cy="0"/>
+        </a:xfrm>
+      </p:grpSpPr>
       <p:pic>
         <p:nvPicPr>
           <p:cNvPr id="5" name="Picture 4" descr="Chart, diagram, box and whisker chart&#10;&#10;Description automatically generated">
@@ -4740,14 +4659,231 @@
         </p:blipFill>
         <p:spPr>
           <a:xfrm>
-            <a:off x="6853187" y="107347"/>
-            <a:ext cx="5150452" cy="4248183"/>
+            <a:off x="6096000" y="79355"/>
+            <a:ext cx="5907639" cy="4872724"/>
           </a:xfrm>
           <a:prstGeom prst="rect">
             <a:avLst/>
           </a:prstGeom>
         </p:spPr>
       </p:pic>
+      <p:sp>
+        <p:nvSpPr>
+          <p:cNvPr id="2" name="Title 1">
+            <a:extLst>
+              <a:ext uri="{FF2B5EF4-FFF2-40B4-BE49-F238E27FC236}">
+                <a16:creationId xmlns:a16="http://schemas.microsoft.com/office/drawing/2014/main" id="{852D0457-2699-8845-A100-66017B4A1BA7}"/>
+              </a:ext>
+            </a:extLst>
+          </p:cNvPr>
+          <p:cNvSpPr>
+            <a:spLocks noGrp="1"/>
+          </p:cNvSpPr>
+          <p:nvPr>
+            <p:ph type="title"/>
+          </p:nvPr>
+        </p:nvSpPr>
+        <p:spPr/>
+        <p:txBody>
+          <a:bodyPr/>
+          <a:lstStyle/>
+          <a:p>
+            <a:r>
+              <a:rPr lang="en-US" altLang="zh-TW" dirty="0"/>
+              <a:t>Ref</a:t>
+            </a:r>
+            <a:r>
+              <a:rPr lang="zh-TW" altLang="en-US" dirty="0"/>
+              <a:t> </a:t>
+            </a:r>
+            <a:r>
+              <a:rPr lang="en-US" altLang="zh-TW" dirty="0"/>
+              <a:t>name</a:t>
+            </a:r>
+            <a:endParaRPr lang="en-US" dirty="0"/>
+          </a:p>
+        </p:txBody>
+      </p:sp>
+      <p:sp>
+        <p:nvSpPr>
+          <p:cNvPr id="3" name="Content Placeholder 2">
+            <a:extLst>
+              <a:ext uri="{FF2B5EF4-FFF2-40B4-BE49-F238E27FC236}">
+                <a16:creationId xmlns:a16="http://schemas.microsoft.com/office/drawing/2014/main" id="{1C602A0B-3F3C-7C4B-A8AF-4B5C30519079}"/>
+              </a:ext>
+            </a:extLst>
+          </p:cNvPr>
+          <p:cNvSpPr>
+            <a:spLocks noGrp="1"/>
+          </p:cNvSpPr>
+          <p:nvPr>
+            <p:ph idx="1"/>
+          </p:nvPr>
+        </p:nvSpPr>
+        <p:spPr>
+          <a:xfrm>
+            <a:off x="424314" y="1928780"/>
+            <a:ext cx="10515600" cy="4351338"/>
+          </a:xfrm>
+        </p:spPr>
+        <p:txBody>
+          <a:bodyPr/>
+          <a:lstStyle/>
+          <a:p>
+            <a:pPr marL="0" indent="0">
+              <a:buNone/>
+            </a:pPr>
+            <a:r>
+              <a:rPr lang="ja-JP" altLang="en-US"/>
+              <a:t>頂部</a:t>
+            </a:r>
+            <a:r>
+              <a:rPr lang="en-US" altLang="ja-JP" dirty="0"/>
+              <a:t>:</a:t>
+            </a:r>
+            <a:r>
+              <a:rPr lang="en-US" dirty="0"/>
+              <a:t>header</a:t>
+            </a:r>
+            <a:br>
+              <a:rPr lang="en-US" dirty="0"/>
+            </a:br>
+            <a:r>
+              <a:rPr lang="ja-JP" altLang="en-US"/>
+              <a:t>內容</a:t>
+            </a:r>
+            <a:r>
+              <a:rPr lang="en-US" altLang="ja-JP" dirty="0"/>
+              <a:t>:</a:t>
+            </a:r>
+            <a:r>
+              <a:rPr lang="en-US" dirty="0"/>
+              <a:t>content/container</a:t>
+            </a:r>
+            <a:br>
+              <a:rPr lang="en-US" dirty="0"/>
+            </a:br>
+            <a:r>
+              <a:rPr lang="ja-JP" altLang="en-US"/>
+              <a:t>尾部</a:t>
+            </a:r>
+            <a:r>
+              <a:rPr lang="en-US" altLang="ja-JP" dirty="0"/>
+              <a:t>:</a:t>
+            </a:r>
+            <a:r>
+              <a:rPr lang="en-US" dirty="0"/>
+              <a:t>footer</a:t>
+            </a:r>
+            <a:br>
+              <a:rPr lang="en-US" dirty="0"/>
+            </a:br>
+            <a:r>
+              <a:rPr lang="ja-JP" altLang="en-US"/>
+              <a:t>選單</a:t>
+            </a:r>
+            <a:r>
+              <a:rPr lang="en-US" altLang="ja-JP" dirty="0"/>
+              <a:t>:</a:t>
+            </a:r>
+            <a:r>
+              <a:rPr lang="en-US" dirty="0"/>
+              <a:t>nav/navigation</a:t>
+            </a:r>
+            <a:br>
+              <a:rPr lang="en-US" dirty="0"/>
+            </a:br>
+            <a:r>
+              <a:rPr lang="ja-JP" altLang="en-US"/>
+              <a:t>側欄</a:t>
+            </a:r>
+            <a:r>
+              <a:rPr lang="en-US" altLang="ja-JP" dirty="0"/>
+              <a:t>:</a:t>
+            </a:r>
+            <a:r>
+              <a:rPr lang="en-US" dirty="0"/>
+              <a:t>sidebar</a:t>
+            </a:r>
+            <a:br>
+              <a:rPr lang="en-US" dirty="0"/>
+            </a:br>
+            <a:r>
+              <a:rPr lang="ja-JP" altLang="en-US"/>
+              <a:t>欄目</a:t>
+            </a:r>
+            <a:r>
+              <a:rPr lang="en-US" altLang="ja-JP" dirty="0"/>
+              <a:t>:</a:t>
+            </a:r>
+            <a:r>
+              <a:rPr lang="en-US" dirty="0"/>
+              <a:t>column</a:t>
+            </a:r>
+            <a:br>
+              <a:rPr lang="en-US" dirty="0"/>
+            </a:br>
+            <a:r>
+              <a:rPr lang="ja-JP" altLang="en-US"/>
+              <a:t>頁面控制整體佈局寬度</a:t>
+            </a:r>
+            <a:r>
+              <a:rPr lang="en-US" altLang="ja-JP" dirty="0"/>
+              <a:t>:</a:t>
+            </a:r>
+            <a:r>
+              <a:rPr lang="en-US" dirty="0"/>
+              <a:t>wrapper</a:t>
+            </a:r>
+            <a:br>
+              <a:rPr lang="en-US" dirty="0"/>
+            </a:br>
+            <a:r>
+              <a:rPr lang="ja-JP" altLang="en-US"/>
+              <a:t>主要區域</a:t>
+            </a:r>
+            <a:r>
+              <a:rPr lang="en-US" altLang="ja-JP" dirty="0"/>
+              <a:t>(</a:t>
+            </a:r>
+            <a:r>
+              <a:rPr lang="ja-JP" altLang="en-US"/>
+              <a:t>通常為頁面主要內容部份</a:t>
+            </a:r>
+            <a:r>
+              <a:rPr lang="en-US" altLang="ja-JP" dirty="0"/>
+              <a:t>):</a:t>
+            </a:r>
+            <a:r>
+              <a:rPr lang="en-US" dirty="0"/>
+              <a:t>primary</a:t>
+            </a:r>
+            <a:br>
+              <a:rPr lang="en-US" dirty="0"/>
+            </a:br>
+            <a:r>
+              <a:rPr lang="ja-JP" altLang="en-US"/>
+              <a:t>次要區域</a:t>
+            </a:r>
+            <a:r>
+              <a:rPr lang="en-US" altLang="ja-JP" dirty="0"/>
+              <a:t>(</a:t>
+            </a:r>
+            <a:r>
+              <a:rPr lang="ja-JP" altLang="en-US"/>
+              <a:t>通常為次選單</a:t>
+            </a:r>
+            <a:r>
+              <a:rPr lang="en-US" altLang="ja-JP" dirty="0"/>
+              <a:t>):</a:t>
+            </a:r>
+            <a:r>
+              <a:rPr lang="en-US" dirty="0"/>
+              <a:t>secondary</a:t>
+            </a:r>
+          </a:p>
+        </p:txBody>
+      </p:sp>
       <p:sp>
         <p:nvSpPr>
           <p:cNvPr id="6" name="Rectangle 5">

</xml_diff>